<commit_message>
On drawing lstm networks
</commit_message>
<xml_diff>
--- a/changgyu_참고자료/3D_error_increasing.pptx
+++ b/changgyu_참고자료/3D_error_increasing.pptx
@@ -104,6 +104,11 @@
       </a:defRPr>
     </a:lvl9pPr>
   </p:defaultTextStyle>
+  <p:extLst>
+    <p:ext uri="{EFAFB233-063F-42B5-8137-9DF3F51BA10A}">
+      <p15:sldGuideLst xmlns:p15="http://schemas.microsoft.com/office/powerpoint/2012/main"/>
+    </p:ext>
+  </p:extLst>
 </p:presentation>
 </file>
 
@@ -238,7 +243,7 @@
           <a:p>
             <a:fld id="{22D02521-3544-4A5E-9A06-620D341E90FA}" type="datetimeFigureOut">
               <a:rPr lang="ko-KR" altLang="en-US" smtClean="0"/>
-              <a:t>2019-01-02</a:t>
+              <a:t>2019-01-03</a:t>
             </a:fld>
             <a:endParaRPr lang="ko-KR" altLang="en-US"/>
           </a:p>
@@ -408,7 +413,7 @@
           <a:p>
             <a:fld id="{22D02521-3544-4A5E-9A06-620D341E90FA}" type="datetimeFigureOut">
               <a:rPr lang="ko-KR" altLang="en-US" smtClean="0"/>
-              <a:t>2019-01-02</a:t>
+              <a:t>2019-01-03</a:t>
             </a:fld>
             <a:endParaRPr lang="ko-KR" altLang="en-US"/>
           </a:p>
@@ -588,7 +593,7 @@
           <a:p>
             <a:fld id="{22D02521-3544-4A5E-9A06-620D341E90FA}" type="datetimeFigureOut">
               <a:rPr lang="ko-KR" altLang="en-US" smtClean="0"/>
-              <a:t>2019-01-02</a:t>
+              <a:t>2019-01-03</a:t>
             </a:fld>
             <a:endParaRPr lang="ko-KR" altLang="en-US"/>
           </a:p>
@@ -758,7 +763,7 @@
           <a:p>
             <a:fld id="{22D02521-3544-4A5E-9A06-620D341E90FA}" type="datetimeFigureOut">
               <a:rPr lang="ko-KR" altLang="en-US" smtClean="0"/>
-              <a:t>2019-01-02</a:t>
+              <a:t>2019-01-03</a:t>
             </a:fld>
             <a:endParaRPr lang="ko-KR" altLang="en-US"/>
           </a:p>
@@ -1002,7 +1007,7 @@
           <a:p>
             <a:fld id="{22D02521-3544-4A5E-9A06-620D341E90FA}" type="datetimeFigureOut">
               <a:rPr lang="ko-KR" altLang="en-US" smtClean="0"/>
-              <a:t>2019-01-02</a:t>
+              <a:t>2019-01-03</a:t>
             </a:fld>
             <a:endParaRPr lang="ko-KR" altLang="en-US"/>
           </a:p>
@@ -1234,7 +1239,7 @@
           <a:p>
             <a:fld id="{22D02521-3544-4A5E-9A06-620D341E90FA}" type="datetimeFigureOut">
               <a:rPr lang="ko-KR" altLang="en-US" smtClean="0"/>
-              <a:t>2019-01-02</a:t>
+              <a:t>2019-01-03</a:t>
             </a:fld>
             <a:endParaRPr lang="ko-KR" altLang="en-US"/>
           </a:p>
@@ -1601,7 +1606,7 @@
           <a:p>
             <a:fld id="{22D02521-3544-4A5E-9A06-620D341E90FA}" type="datetimeFigureOut">
               <a:rPr lang="ko-KR" altLang="en-US" smtClean="0"/>
-              <a:t>2019-01-02</a:t>
+              <a:t>2019-01-03</a:t>
             </a:fld>
             <a:endParaRPr lang="ko-KR" altLang="en-US"/>
           </a:p>
@@ -1719,7 +1724,7 @@
           <a:p>
             <a:fld id="{22D02521-3544-4A5E-9A06-620D341E90FA}" type="datetimeFigureOut">
               <a:rPr lang="ko-KR" altLang="en-US" smtClean="0"/>
-              <a:t>2019-01-02</a:t>
+              <a:t>2019-01-03</a:t>
             </a:fld>
             <a:endParaRPr lang="ko-KR" altLang="en-US"/>
           </a:p>
@@ -1814,7 +1819,7 @@
           <a:p>
             <a:fld id="{22D02521-3544-4A5E-9A06-620D341E90FA}" type="datetimeFigureOut">
               <a:rPr lang="ko-KR" altLang="en-US" smtClean="0"/>
-              <a:t>2019-01-02</a:t>
+              <a:t>2019-01-03</a:t>
             </a:fld>
             <a:endParaRPr lang="ko-KR" altLang="en-US"/>
           </a:p>
@@ -2091,7 +2096,7 @@
           <a:p>
             <a:fld id="{22D02521-3544-4A5E-9A06-620D341E90FA}" type="datetimeFigureOut">
               <a:rPr lang="ko-KR" altLang="en-US" smtClean="0"/>
-              <a:t>2019-01-02</a:t>
+              <a:t>2019-01-03</a:t>
             </a:fld>
             <a:endParaRPr lang="ko-KR" altLang="en-US"/>
           </a:p>
@@ -2348,7 +2353,7 @@
           <a:p>
             <a:fld id="{22D02521-3544-4A5E-9A06-620D341E90FA}" type="datetimeFigureOut">
               <a:rPr lang="ko-KR" altLang="en-US" smtClean="0"/>
-              <a:t>2019-01-02</a:t>
+              <a:t>2019-01-03</a:t>
             </a:fld>
             <a:endParaRPr lang="ko-KR" altLang="en-US"/>
           </a:p>
@@ -2561,7 +2566,7 @@
           <a:p>
             <a:fld id="{22D02521-3544-4A5E-9A06-620D341E90FA}" type="datetimeFigureOut">
               <a:rPr lang="ko-KR" altLang="en-US" smtClean="0"/>
-              <a:t>2019-01-02</a:t>
+              <a:t>2019-01-03</a:t>
             </a:fld>
             <a:endParaRPr lang="ko-KR" altLang="en-US"/>
           </a:p>
@@ -2974,13 +2979,13 @@
         </p:nvCxnSpPr>
         <p:spPr>
           <a:xfrm>
-            <a:off x="1148080" y="3429000"/>
+            <a:off x="1262380" y="3429000"/>
             <a:ext cx="6858000" cy="0"/>
           </a:xfrm>
           <a:prstGeom prst="line">
             <a:avLst/>
           </a:prstGeom>
-          <a:ln w="15875">
+          <a:ln w="19050">
             <a:solidFill>
               <a:schemeClr val="tx1"/>
             </a:solidFill>
@@ -3009,7 +3014,7 @@
         </p:nvSpPr>
         <p:spPr>
           <a:xfrm>
-            <a:off x="-1755910" y="189000"/>
+            <a:off x="-1641610" y="189000"/>
             <a:ext cx="6480000" cy="6480000"/>
           </a:xfrm>
           <a:prstGeom prst="arc">
@@ -3018,56 +3023,9 @@
               <a:gd name="adj2" fmla="val 4204342"/>
             </a:avLst>
           </a:prstGeom>
-          <a:ln w="15875"/>
-        </p:spPr>
-        <p:style>
-          <a:lnRef idx="1">
-            <a:schemeClr val="dk1"/>
-          </a:lnRef>
-          <a:fillRef idx="0">
-            <a:schemeClr val="dk1"/>
-          </a:fillRef>
-          <a:effectRef idx="0">
-            <a:schemeClr val="dk1"/>
-          </a:effectRef>
-          <a:fontRef idx="minor">
-            <a:schemeClr val="tx1"/>
-          </a:fontRef>
-        </p:style>
-        <p:txBody>
-          <a:bodyPr rot="0" spcFirstLastPara="0" vertOverflow="overflow" horzOverflow="overflow" vert="horz" wrap="square" lIns="68580" tIns="34290" rIns="68580" bIns="34290" numCol="1" spcCol="0" rtlCol="0" fromWordArt="0" anchor="ctr" anchorCtr="0" forceAA="0" compatLnSpc="1">
-            <a:prstTxWarp prst="textNoShape">
-              <a:avLst/>
-            </a:prstTxWarp>
-            <a:noAutofit/>
-          </a:bodyPr>
-          <a:lstStyle/>
-          <a:p>
-            <a:pPr algn="ctr"/>
-            <a:endParaRPr lang="ko-KR" altLang="en-US" sz="1350"/>
-          </a:p>
-        </p:txBody>
-      </p:sp>
-      <p:sp>
-        <p:nvSpPr>
-          <p:cNvPr id="30" name="원호 29"/>
-          <p:cNvSpPr/>
-          <p:nvPr/>
-        </p:nvSpPr>
-        <p:spPr>
-          <a:xfrm>
-            <a:off x="-2115910" y="-171000"/>
-            <a:ext cx="7200000" cy="7200000"/>
-          </a:xfrm>
-          <a:prstGeom prst="arc">
-            <a:avLst>
-              <a:gd name="adj1" fmla="val 17383966"/>
-              <a:gd name="adj2" fmla="val 4303215"/>
-            </a:avLst>
-          </a:prstGeom>
-          <a:ln w="15875">
+          <a:ln w="19050">
             <a:solidFill>
-              <a:srgbClr val="253ADE"/>
+              <a:schemeClr val="tx1"/>
             </a:solidFill>
           </a:ln>
         </p:spPr>
@@ -3101,13 +3059,64 @@
       </p:sp>
       <p:sp>
         <p:nvSpPr>
+          <p:cNvPr id="30" name="원호 29"/>
+          <p:cNvSpPr/>
+          <p:nvPr/>
+        </p:nvSpPr>
+        <p:spPr>
+          <a:xfrm>
+            <a:off x="-2001610" y="-171000"/>
+            <a:ext cx="7200000" cy="7200000"/>
+          </a:xfrm>
+          <a:prstGeom prst="arc">
+            <a:avLst>
+              <a:gd name="adj1" fmla="val 17383966"/>
+              <a:gd name="adj2" fmla="val 4214528"/>
+            </a:avLst>
+          </a:prstGeom>
+          <a:ln w="25400">
+            <a:solidFill>
+              <a:srgbClr val="002060"/>
+            </a:solidFill>
+          </a:ln>
+        </p:spPr>
+        <p:style>
+          <a:lnRef idx="1">
+            <a:schemeClr val="dk1"/>
+          </a:lnRef>
+          <a:fillRef idx="0">
+            <a:schemeClr val="dk1"/>
+          </a:fillRef>
+          <a:effectRef idx="0">
+            <a:schemeClr val="dk1"/>
+          </a:effectRef>
+          <a:fontRef idx="minor">
+            <a:schemeClr val="tx1"/>
+          </a:fontRef>
+        </p:style>
+        <p:txBody>
+          <a:bodyPr rot="0" spcFirstLastPara="0" vertOverflow="overflow" horzOverflow="overflow" vert="horz" wrap="square" lIns="68580" tIns="34290" rIns="68580" bIns="34290" numCol="1" spcCol="0" rtlCol="0" fromWordArt="0" anchor="ctr" anchorCtr="0" forceAA="0" compatLnSpc="1">
+            <a:prstTxWarp prst="textNoShape">
+              <a:avLst/>
+            </a:prstTxWarp>
+            <a:noAutofit/>
+          </a:bodyPr>
+          <a:lstStyle/>
+          <a:p>
+            <a:pPr algn="ctr"/>
+            <a:endParaRPr lang="ko-KR" altLang="en-US" sz="1350"/>
+          </a:p>
+        </p:txBody>
+      </p:sp>
+      <p:sp>
+        <p:nvSpPr>
           <p:cNvPr id="14" name="원호 13"/>
           <p:cNvSpPr/>
           <p:nvPr/>
         </p:nvSpPr>
         <p:spPr>
           <a:xfrm>
-            <a:off x="4724090" y="549000"/>
+            <a:off x="4838390" y="549000"/>
             <a:ext cx="5760000" cy="5760000"/>
           </a:xfrm>
           <a:prstGeom prst="arc">
@@ -3116,7 +3125,7 @@
               <a:gd name="adj2" fmla="val 15976253"/>
             </a:avLst>
           </a:prstGeom>
-          <a:ln w="15875">
+          <a:ln w="19050">
             <a:solidFill>
               <a:schemeClr val="tx1"/>
             </a:solidFill>
@@ -3153,7 +3162,7 @@
         </p:nvCxnSpPr>
         <p:spPr>
           <a:xfrm flipV="1">
-            <a:off x="3200400" y="407120"/>
+            <a:off x="3314700" y="407120"/>
             <a:ext cx="213360" cy="232960"/>
           </a:xfrm>
           <a:prstGeom prst="straightConnector1">
@@ -3161,7 +3170,7 @@
           </a:prstGeom>
           <a:ln>
             <a:solidFill>
-              <a:srgbClr val="253ADE"/>
+              <a:srgbClr val="002060"/>
             </a:solidFill>
             <a:tailEnd type="triangle"/>
           </a:ln>
@@ -3189,7 +3198,7 @@
         </p:nvCxnSpPr>
         <p:spPr>
           <a:xfrm>
-            <a:off x="4329260" y="5080000"/>
+            <a:off x="4443560" y="5080000"/>
             <a:ext cx="234780" cy="162561"/>
           </a:xfrm>
           <a:prstGeom prst="straightConnector1">
@@ -3197,7 +3206,7 @@
           </a:prstGeom>
           <a:ln>
             <a:solidFill>
-              <a:srgbClr val="253ADE"/>
+              <a:srgbClr val="002060"/>
             </a:solidFill>
             <a:tailEnd type="triangle"/>
           </a:ln>
@@ -3225,7 +3234,7 @@
         </p:nvCxnSpPr>
         <p:spPr>
           <a:xfrm flipV="1">
-            <a:off x="4206240" y="1449400"/>
+            <a:off x="4320540" y="1449400"/>
             <a:ext cx="256200" cy="135560"/>
           </a:xfrm>
           <a:prstGeom prst="straightConnector1">
@@ -3233,7 +3242,7 @@
           </a:prstGeom>
           <a:ln>
             <a:solidFill>
-              <a:srgbClr val="253ADE"/>
+              <a:srgbClr val="002060"/>
             </a:solidFill>
             <a:tailEnd type="triangle"/>
           </a:ln>
@@ -3261,7 +3270,7 @@
         </p:nvCxnSpPr>
         <p:spPr>
           <a:xfrm>
-            <a:off x="3337560" y="6086021"/>
+            <a:off x="3451860" y="6086021"/>
             <a:ext cx="215560" cy="263800"/>
           </a:xfrm>
           <a:prstGeom prst="straightConnector1">
@@ -3269,7 +3278,7 @@
           </a:prstGeom>
           <a:ln>
             <a:solidFill>
-              <a:srgbClr val="253ADE"/>
+              <a:srgbClr val="002060"/>
             </a:solidFill>
             <a:tailEnd type="triangle"/>
           </a:ln>
@@ -3297,7 +3306,41 @@
         </p:nvSpPr>
         <p:spPr>
           <a:xfrm>
-            <a:off x="1314813" y="3259127"/>
+            <a:off x="1429113" y="3259127"/>
+            <a:ext cx="338554" cy="461665"/>
+          </a:xfrm>
+          <a:prstGeom prst="rect">
+            <a:avLst/>
+          </a:prstGeom>
+          <a:noFill/>
+          <a:ln>
+            <a:noFill/>
+          </a:ln>
+        </p:spPr>
+        <p:txBody>
+          <a:bodyPr wrap="none" rtlCol="0">
+            <a:spAutoFit/>
+          </a:bodyPr>
+          <a:lstStyle/>
+          <a:p>
+            <a:pPr algn="ctr"/>
+            <a:r>
+              <a:rPr lang="en-US" altLang="ko-KR" sz="2400" dirty="0" smtClean="0"/>
+              <a:t>*</a:t>
+            </a:r>
+            <a:endParaRPr lang="ko-KR" altLang="en-US" sz="2400" dirty="0"/>
+          </a:p>
+        </p:txBody>
+      </p:sp>
+      <p:sp>
+        <p:nvSpPr>
+          <p:cNvPr id="56" name="TextBox 55"/>
+          <p:cNvSpPr txBox="1"/>
+          <p:nvPr/>
+        </p:nvSpPr>
+        <p:spPr>
+          <a:xfrm>
+            <a:off x="7547023" y="3259127"/>
             <a:ext cx="338554" cy="461665"/>
           </a:xfrm>
           <a:prstGeom prst="rect">
@@ -3322,49 +3365,27 @@
       </p:sp>
       <p:sp>
         <p:nvSpPr>
-          <p:cNvPr id="56" name="TextBox 55"/>
-          <p:cNvSpPr txBox="1"/>
-          <p:nvPr/>
-        </p:nvSpPr>
-        <p:spPr>
-          <a:xfrm>
-            <a:off x="7432723" y="3259127"/>
-            <a:ext cx="338554" cy="461665"/>
-          </a:xfrm>
-          <a:prstGeom prst="rect">
-            <a:avLst/>
-          </a:prstGeom>
-          <a:noFill/>
-        </p:spPr>
-        <p:txBody>
-          <a:bodyPr wrap="none" rtlCol="0">
-            <a:spAutoFit/>
-          </a:bodyPr>
-          <a:lstStyle/>
-          <a:p>
-            <a:pPr algn="ctr"/>
-            <a:r>
-              <a:rPr lang="en-US" altLang="ko-KR" sz="2400" dirty="0" smtClean="0"/>
-              <a:t>*</a:t>
-            </a:r>
-            <a:endParaRPr lang="ko-KR" altLang="en-US" sz="2400" dirty="0"/>
-          </a:p>
-        </p:txBody>
-      </p:sp>
-      <p:sp>
-        <p:nvSpPr>
           <p:cNvPr id="57" name="오른쪽 화살표 56"/>
           <p:cNvSpPr/>
           <p:nvPr/>
         </p:nvSpPr>
         <p:spPr>
           <a:xfrm>
-            <a:off x="4724090" y="3344063"/>
-            <a:ext cx="160050" cy="169874"/>
+            <a:off x="4838388" y="3344063"/>
+            <a:ext cx="213361" cy="169874"/>
           </a:xfrm>
           <a:prstGeom prst="rightArrow">
-            <a:avLst/>
+            <a:avLst>
+              <a:gd name="adj1" fmla="val 50000"/>
+              <a:gd name="adj2" fmla="val 52976"/>
+            </a:avLst>
           </a:prstGeom>
+          <a:solidFill>
+            <a:schemeClr val="tx1"/>
+          </a:solidFill>
+          <a:ln>
+            <a:noFill/>
+          </a:ln>
         </p:spPr>
         <p:style>
           <a:lnRef idx="2">
@@ -3399,12 +3420,21 @@
         </p:nvSpPr>
         <p:spPr>
           <a:xfrm rot="16200000">
-            <a:off x="4391847" y="2812568"/>
+            <a:off x="4506147" y="2812568"/>
             <a:ext cx="1062990" cy="169874"/>
           </a:xfrm>
           <a:prstGeom prst="rightArrow">
-            <a:avLst/>
+            <a:avLst>
+              <a:gd name="adj1" fmla="val 50000"/>
+              <a:gd name="adj2" fmla="val 92054"/>
+            </a:avLst>
           </a:prstGeom>
+          <a:solidFill>
+            <a:schemeClr val="tx1"/>
+          </a:solidFill>
+          <a:ln>
+            <a:noFill/>
+          </a:ln>
         </p:spPr>
         <p:style>
           <a:lnRef idx="2">
@@ -3439,7 +3469,7 @@
         </p:nvCxnSpPr>
         <p:spPr>
           <a:xfrm>
-            <a:off x="210312" y="3429000"/>
+            <a:off x="324612" y="3429000"/>
             <a:ext cx="724408" cy="0"/>
           </a:xfrm>
           <a:prstGeom prst="straightConnector1">
@@ -3475,7 +3505,7 @@
         </p:nvCxnSpPr>
         <p:spPr>
           <a:xfrm flipV="1">
-            <a:off x="210312" y="2705400"/>
+            <a:off x="324612" y="2705400"/>
             <a:ext cx="13208" cy="723600"/>
           </a:xfrm>
           <a:prstGeom prst="straightConnector1">
@@ -3503,6 +3533,829 @@
           </a:fontRef>
         </p:style>
       </p:cxnSp>
+      <mc:AlternateContent xmlns:mc="http://schemas.openxmlformats.org/markup-compatibility/2006">
+        <mc:Choice xmlns:a14="http://schemas.microsoft.com/office/drawing/2010/main" Requires="a14">
+          <p:sp>
+            <p:nvSpPr>
+              <p:cNvPr id="2" name="TextBox 1"/>
+              <p:cNvSpPr txBox="1"/>
+              <p:nvPr/>
+            </p:nvSpPr>
+            <p:spPr>
+              <a:xfrm>
+                <a:off x="428471" y="3443793"/>
+                <a:ext cx="510844" cy="307777"/>
+              </a:xfrm>
+              <a:prstGeom prst="rect">
+                <a:avLst/>
+              </a:prstGeom>
+              <a:noFill/>
+            </p:spPr>
+            <p:txBody>
+              <a:bodyPr wrap="none" lIns="0" tIns="0" rIns="0" bIns="0" rtlCol="0">
+                <a:spAutoFit/>
+              </a:bodyPr>
+              <a:lstStyle/>
+              <a:p>
+                <a14:m>
+                  <m:oMathPara xmlns:m="http://schemas.openxmlformats.org/officeDocument/2006/math">
+                    <m:oMathParaPr>
+                      <m:jc m:val="centerGroup"/>
+                    </m:oMathParaPr>
+                    <m:oMath xmlns:m="http://schemas.openxmlformats.org/officeDocument/2006/math">
+                      <m:r>
+                        <a:rPr lang="ko-KR" altLang="en-US" sz="2000" b="1" i="1" smtClean="0">
+                          <a:latin typeface="Cambria Math" panose="02040503050406030204" pitchFamily="18" charset="0"/>
+                        </a:rPr>
+                        <m:t>𝒙</m:t>
+                      </m:r>
+                      <m:r>
+                        <a:rPr lang="en-US" altLang="ko-KR" sz="2000" b="1" i="1" smtClean="0">
+                          <a:latin typeface="Cambria Math" panose="02040503050406030204" pitchFamily="18" charset="0"/>
+                        </a:rPr>
+                        <m:t>, </m:t>
+                      </m:r>
+                      <m:r>
+                        <a:rPr lang="en-US" altLang="ko-KR" sz="2000" b="1" i="1" smtClean="0">
+                          <a:latin typeface="Cambria Math" panose="02040503050406030204" pitchFamily="18" charset="0"/>
+                        </a:rPr>
+                        <m:t>𝒚</m:t>
+                      </m:r>
+                      <m:r>
+                        <a:rPr lang="en-US" altLang="ko-KR" sz="2000" b="1" i="1" smtClean="0">
+                          <a:latin typeface="Cambria Math" panose="02040503050406030204" pitchFamily="18" charset="0"/>
+                        </a:rPr>
+                        <m:t> </m:t>
+                      </m:r>
+                    </m:oMath>
+                  </m:oMathPara>
+                </a14:m>
+                <a:endParaRPr lang="ko-KR" altLang="en-US" sz="2000" b="1" dirty="0"/>
+              </a:p>
+            </p:txBody>
+          </p:sp>
+        </mc:Choice>
+        <mc:Fallback>
+          <p:sp>
+            <p:nvSpPr>
+              <p:cNvPr id="2" name="TextBox 1"/>
+              <p:cNvSpPr txBox="1">
+                <a:spLocks noRot="1" noChangeAspect="1" noMove="1" noResize="1" noEditPoints="1" noAdjustHandles="1" noChangeArrowheads="1" noChangeShapeType="1" noTextEdit="1"/>
+              </p:cNvSpPr>
+              <p:nvPr/>
+            </p:nvSpPr>
+            <p:spPr>
+              <a:xfrm>
+                <a:off x="428471" y="3443793"/>
+                <a:ext cx="510844" cy="307777"/>
+              </a:xfrm>
+              <a:prstGeom prst="rect">
+                <a:avLst/>
+              </a:prstGeom>
+              <a:blipFill>
+                <a:blip r:embed="rId2"/>
+                <a:stretch>
+                  <a:fillRect l="-7143" r="-1190" b="-26000"/>
+                </a:stretch>
+              </a:blipFill>
+            </p:spPr>
+            <p:txBody>
+              <a:bodyPr/>
+              <a:lstStyle/>
+              <a:p>
+                <a:r>
+                  <a:rPr lang="ko-KR" altLang="en-US">
+                    <a:noFill/>
+                  </a:rPr>
+                  <a:t> </a:t>
+                </a:r>
+              </a:p>
+            </p:txBody>
+          </p:sp>
+        </mc:Fallback>
+      </mc:AlternateContent>
+      <mc:AlternateContent xmlns:mc="http://schemas.openxmlformats.org/markup-compatibility/2006">
+        <mc:Choice xmlns:a14="http://schemas.microsoft.com/office/drawing/2010/main" Requires="a14">
+          <p:sp>
+            <p:nvSpPr>
+              <p:cNvPr id="18" name="TextBox 17"/>
+              <p:cNvSpPr txBox="1"/>
+              <p:nvPr/>
+            </p:nvSpPr>
+            <p:spPr>
+              <a:xfrm>
+                <a:off x="343929" y="2928700"/>
+                <a:ext cx="190758" cy="307777"/>
+              </a:xfrm>
+              <a:prstGeom prst="rect">
+                <a:avLst/>
+              </a:prstGeom>
+              <a:noFill/>
+            </p:spPr>
+            <p:txBody>
+              <a:bodyPr wrap="none" lIns="0" tIns="0" rIns="0" bIns="0" rtlCol="0">
+                <a:spAutoFit/>
+              </a:bodyPr>
+              <a:lstStyle/>
+              <a:p>
+                <a14:m>
+                  <m:oMathPara xmlns:m="http://schemas.openxmlformats.org/officeDocument/2006/math">
+                    <m:oMathParaPr>
+                      <m:jc m:val="centerGroup"/>
+                    </m:oMathParaPr>
+                    <m:oMath xmlns:m="http://schemas.openxmlformats.org/officeDocument/2006/math">
+                      <m:r>
+                        <a:rPr lang="en-US" altLang="ko-KR" sz="2000" b="1" i="1" smtClean="0">
+                          <a:latin typeface="Cambria Math" panose="02040503050406030204" pitchFamily="18" charset="0"/>
+                        </a:rPr>
+                        <m:t>𝒛</m:t>
+                      </m:r>
+                    </m:oMath>
+                  </m:oMathPara>
+                </a14:m>
+                <a:endParaRPr lang="ko-KR" altLang="en-US" sz="2000" b="1" dirty="0"/>
+              </a:p>
+            </p:txBody>
+          </p:sp>
+        </mc:Choice>
+        <mc:Fallback>
+          <p:sp>
+            <p:nvSpPr>
+              <p:cNvPr id="18" name="TextBox 17"/>
+              <p:cNvSpPr txBox="1">
+                <a:spLocks noRot="1" noChangeAspect="1" noMove="1" noResize="1" noEditPoints="1" noAdjustHandles="1" noChangeArrowheads="1" noChangeShapeType="1" noTextEdit="1"/>
+              </p:cNvSpPr>
+              <p:nvPr/>
+            </p:nvSpPr>
+            <p:spPr>
+              <a:xfrm>
+                <a:off x="343929" y="2928700"/>
+                <a:ext cx="190758" cy="307777"/>
+              </a:xfrm>
+              <a:prstGeom prst="rect">
+                <a:avLst/>
+              </a:prstGeom>
+              <a:blipFill>
+                <a:blip r:embed="rId3"/>
+                <a:stretch>
+                  <a:fillRect l="-18750" r="-18750"/>
+                </a:stretch>
+              </a:blipFill>
+            </p:spPr>
+            <p:txBody>
+              <a:bodyPr/>
+              <a:lstStyle/>
+              <a:p>
+                <a:r>
+                  <a:rPr lang="ko-KR" altLang="en-US">
+                    <a:noFill/>
+                  </a:rPr>
+                  <a:t> </a:t>
+                </a:r>
+              </a:p>
+            </p:txBody>
+          </p:sp>
+        </mc:Fallback>
+      </mc:AlternateContent>
+      <mc:AlternateContent xmlns:mc="http://schemas.openxmlformats.org/markup-compatibility/2006">
+        <mc:Choice xmlns:a14="http://schemas.microsoft.com/office/drawing/2010/main" Requires="a14">
+          <p:sp>
+            <p:nvSpPr>
+              <p:cNvPr id="20" name="TextBox 19"/>
+              <p:cNvSpPr txBox="1"/>
+              <p:nvPr/>
+            </p:nvSpPr>
+            <p:spPr>
+              <a:xfrm>
+                <a:off x="3977786" y="3138219"/>
+                <a:ext cx="815416" cy="307777"/>
+              </a:xfrm>
+              <a:prstGeom prst="rect">
+                <a:avLst/>
+              </a:prstGeom>
+              <a:noFill/>
+            </p:spPr>
+            <p:txBody>
+              <a:bodyPr wrap="none" lIns="0" tIns="0" rIns="0" bIns="0" rtlCol="0">
+                <a:spAutoFit/>
+              </a:bodyPr>
+              <a:lstStyle/>
+              <a:p>
+                <a14:m>
+                  <m:oMathPara xmlns:m="http://schemas.openxmlformats.org/officeDocument/2006/math">
+                    <m:oMathParaPr>
+                      <m:jc m:val="centerGroup"/>
+                    </m:oMathParaPr>
+                    <m:oMath xmlns:m="http://schemas.openxmlformats.org/officeDocument/2006/math">
+                      <m:r>
+                        <a:rPr lang="en-US" altLang="ko-KR" sz="2000" i="1">
+                          <a:latin typeface="Cambria Math" panose="02040503050406030204" pitchFamily="18" charset="0"/>
+                          <a:ea typeface="Cambria Math" panose="02040503050406030204" pitchFamily="18" charset="0"/>
+                        </a:rPr>
+                        <m:t>∆</m:t>
+                      </m:r>
+                      <m:r>
+                        <a:rPr lang="ko-KR" altLang="en-US" sz="2000" b="1" i="1" smtClean="0">
+                          <a:latin typeface="Cambria Math" panose="02040503050406030204" pitchFamily="18" charset="0"/>
+                        </a:rPr>
+                        <m:t>𝒙</m:t>
+                      </m:r>
+                      <m:r>
+                        <a:rPr lang="en-US" altLang="ko-KR" sz="2000" b="1" i="1" smtClean="0">
+                          <a:latin typeface="Cambria Math" panose="02040503050406030204" pitchFamily="18" charset="0"/>
+                        </a:rPr>
+                        <m:t>,</m:t>
+                      </m:r>
+                      <m:r>
+                        <a:rPr lang="en-US" altLang="ko-KR" sz="2000" i="1">
+                          <a:latin typeface="Cambria Math" panose="02040503050406030204" pitchFamily="18" charset="0"/>
+                          <a:ea typeface="Cambria Math" panose="02040503050406030204" pitchFamily="18" charset="0"/>
+                        </a:rPr>
+                        <m:t>∆</m:t>
+                      </m:r>
+                      <m:r>
+                        <a:rPr lang="en-US" altLang="ko-KR" sz="2000" b="1" i="1" smtClean="0">
+                          <a:latin typeface="Cambria Math" panose="02040503050406030204" pitchFamily="18" charset="0"/>
+                        </a:rPr>
+                        <m:t>𝒚</m:t>
+                      </m:r>
+                      <m:r>
+                        <a:rPr lang="en-US" altLang="ko-KR" sz="2000" b="1" i="1" smtClean="0">
+                          <a:latin typeface="Cambria Math" panose="02040503050406030204" pitchFamily="18" charset="0"/>
+                        </a:rPr>
+                        <m:t> </m:t>
+                      </m:r>
+                    </m:oMath>
+                  </m:oMathPara>
+                </a14:m>
+                <a:endParaRPr lang="ko-KR" altLang="en-US" sz="2000" b="1" dirty="0"/>
+              </a:p>
+            </p:txBody>
+          </p:sp>
+        </mc:Choice>
+        <mc:Fallback>
+          <p:sp>
+            <p:nvSpPr>
+              <p:cNvPr id="20" name="TextBox 19"/>
+              <p:cNvSpPr txBox="1">
+                <a:spLocks noRot="1" noChangeAspect="1" noMove="1" noResize="1" noEditPoints="1" noAdjustHandles="1" noChangeArrowheads="1" noChangeShapeType="1" noTextEdit="1"/>
+              </p:cNvSpPr>
+              <p:nvPr/>
+            </p:nvSpPr>
+            <p:spPr>
+              <a:xfrm>
+                <a:off x="3977786" y="3138219"/>
+                <a:ext cx="815416" cy="307777"/>
+              </a:xfrm>
+              <a:prstGeom prst="rect">
+                <a:avLst/>
+              </a:prstGeom>
+              <a:blipFill>
+                <a:blip r:embed="rId4"/>
+                <a:stretch>
+                  <a:fillRect l="-7519" r="-752" b="-26000"/>
+                </a:stretch>
+              </a:blipFill>
+            </p:spPr>
+            <p:txBody>
+              <a:bodyPr/>
+              <a:lstStyle/>
+              <a:p>
+                <a:r>
+                  <a:rPr lang="ko-KR" altLang="en-US">
+                    <a:noFill/>
+                  </a:rPr>
+                  <a:t> </a:t>
+                </a:r>
+              </a:p>
+            </p:txBody>
+          </p:sp>
+        </mc:Fallback>
+      </mc:AlternateContent>
+      <mc:AlternateContent xmlns:mc="http://schemas.openxmlformats.org/markup-compatibility/2006">
+        <mc:Choice xmlns:a14="http://schemas.microsoft.com/office/drawing/2010/main" Requires="a14">
+          <p:sp>
+            <p:nvSpPr>
+              <p:cNvPr id="21" name="TextBox 20"/>
+              <p:cNvSpPr txBox="1"/>
+              <p:nvPr/>
+            </p:nvSpPr>
+            <p:spPr>
+              <a:xfrm>
+                <a:off x="5119798" y="2774811"/>
+                <a:ext cx="343043" cy="307777"/>
+              </a:xfrm>
+              <a:prstGeom prst="rect">
+                <a:avLst/>
+              </a:prstGeom>
+              <a:noFill/>
+            </p:spPr>
+            <p:txBody>
+              <a:bodyPr wrap="none" lIns="0" tIns="0" rIns="0" bIns="0" rtlCol="0">
+                <a:spAutoFit/>
+              </a:bodyPr>
+              <a:lstStyle/>
+              <a:p>
+                <a14:m>
+                  <m:oMathPara xmlns:m="http://schemas.openxmlformats.org/officeDocument/2006/math">
+                    <m:oMathParaPr>
+                      <m:jc m:val="centerGroup"/>
+                    </m:oMathParaPr>
+                    <m:oMath xmlns:m="http://schemas.openxmlformats.org/officeDocument/2006/math">
+                      <m:r>
+                        <a:rPr lang="en-US" altLang="ko-KR" sz="2000" i="1">
+                          <a:latin typeface="Cambria Math" panose="02040503050406030204" pitchFamily="18" charset="0"/>
+                          <a:ea typeface="Cambria Math" panose="02040503050406030204" pitchFamily="18" charset="0"/>
+                        </a:rPr>
+                        <m:t>∆</m:t>
+                      </m:r>
+                      <m:r>
+                        <a:rPr lang="en-US" altLang="ko-KR" sz="2000" b="1" i="1" smtClean="0">
+                          <a:latin typeface="Cambria Math" panose="02040503050406030204" pitchFamily="18" charset="0"/>
+                        </a:rPr>
+                        <m:t>𝒛</m:t>
+                      </m:r>
+                    </m:oMath>
+                  </m:oMathPara>
+                </a14:m>
+                <a:endParaRPr lang="ko-KR" altLang="en-US" sz="2000" b="1" dirty="0"/>
+              </a:p>
+            </p:txBody>
+          </p:sp>
+        </mc:Choice>
+        <mc:Fallback>
+          <p:sp>
+            <p:nvSpPr>
+              <p:cNvPr id="21" name="TextBox 20"/>
+              <p:cNvSpPr txBox="1">
+                <a:spLocks noRot="1" noChangeAspect="1" noMove="1" noResize="1" noEditPoints="1" noAdjustHandles="1" noChangeArrowheads="1" noChangeShapeType="1" noTextEdit="1"/>
+              </p:cNvSpPr>
+              <p:nvPr/>
+            </p:nvSpPr>
+            <p:spPr>
+              <a:xfrm>
+                <a:off x="5119798" y="2774811"/>
+                <a:ext cx="343043" cy="307777"/>
+              </a:xfrm>
+              <a:prstGeom prst="rect">
+                <a:avLst/>
+              </a:prstGeom>
+              <a:blipFill>
+                <a:blip r:embed="rId5"/>
+                <a:stretch>
+                  <a:fillRect l="-17857" r="-12500" b="-5882"/>
+                </a:stretch>
+              </a:blipFill>
+            </p:spPr>
+            <p:txBody>
+              <a:bodyPr/>
+              <a:lstStyle/>
+              <a:p>
+                <a:r>
+                  <a:rPr lang="ko-KR" altLang="en-US">
+                    <a:noFill/>
+                  </a:rPr>
+                  <a:t> </a:t>
+                </a:r>
+              </a:p>
+            </p:txBody>
+          </p:sp>
+        </mc:Fallback>
+      </mc:AlternateContent>
+      <p:cxnSp>
+        <p:nvCxnSpPr>
+          <p:cNvPr id="5" name="직선 연결선 4"/>
+          <p:cNvCxnSpPr/>
+          <p:nvPr/>
+        </p:nvCxnSpPr>
+        <p:spPr>
+          <a:xfrm flipV="1">
+            <a:off x="1598390" y="1000080"/>
+            <a:ext cx="2646339" cy="2428921"/>
+          </a:xfrm>
+          <a:prstGeom prst="line">
+            <a:avLst/>
+          </a:prstGeom>
+          <a:ln w="19050">
+            <a:solidFill>
+              <a:schemeClr val="tx1"/>
+            </a:solidFill>
+          </a:ln>
+        </p:spPr>
+        <p:style>
+          <a:lnRef idx="1">
+            <a:schemeClr val="accent1"/>
+          </a:lnRef>
+          <a:fillRef idx="0">
+            <a:schemeClr val="accent1"/>
+          </a:fillRef>
+          <a:effectRef idx="0">
+            <a:schemeClr val="accent1"/>
+          </a:effectRef>
+          <a:fontRef idx="minor">
+            <a:schemeClr val="tx1"/>
+          </a:fontRef>
+        </p:style>
+      </p:cxnSp>
+      <p:cxnSp>
+        <p:nvCxnSpPr>
+          <p:cNvPr id="10" name="직선 연결선 9"/>
+          <p:cNvCxnSpPr/>
+          <p:nvPr/>
+        </p:nvCxnSpPr>
+        <p:spPr>
+          <a:xfrm flipH="1">
+            <a:off x="1598391" y="407120"/>
+            <a:ext cx="1115121" cy="3036673"/>
+          </a:xfrm>
+          <a:prstGeom prst="line">
+            <a:avLst/>
+          </a:prstGeom>
+          <a:ln w="19050">
+            <a:solidFill>
+              <a:schemeClr val="tx1"/>
+            </a:solidFill>
+          </a:ln>
+        </p:spPr>
+        <p:style>
+          <a:lnRef idx="1">
+            <a:schemeClr val="accent1"/>
+          </a:lnRef>
+          <a:fillRef idx="0">
+            <a:schemeClr val="accent1"/>
+          </a:fillRef>
+          <a:effectRef idx="0">
+            <a:schemeClr val="accent1"/>
+          </a:effectRef>
+          <a:fontRef idx="minor">
+            <a:schemeClr val="tx1"/>
+          </a:fontRef>
+        </p:style>
+      </p:cxnSp>
+      <mc:AlternateContent xmlns:mc="http://schemas.openxmlformats.org/markup-compatibility/2006">
+        <mc:Choice xmlns:a14="http://schemas.microsoft.com/office/drawing/2010/main" Requires="a14">
+          <p:sp>
+            <p:nvSpPr>
+              <p:cNvPr id="12" name="TextBox 11"/>
+              <p:cNvSpPr txBox="1"/>
+              <p:nvPr/>
+            </p:nvSpPr>
+            <p:spPr>
+              <a:xfrm>
+                <a:off x="1905232" y="1478562"/>
+                <a:ext cx="345671" cy="307777"/>
+              </a:xfrm>
+              <a:prstGeom prst="rect">
+                <a:avLst/>
+              </a:prstGeom>
+              <a:noFill/>
+            </p:spPr>
+            <p:txBody>
+              <a:bodyPr wrap="none" lIns="0" tIns="0" rIns="0" bIns="0" rtlCol="0">
+                <a:spAutoFit/>
+              </a:bodyPr>
+              <a:lstStyle/>
+              <a:p>
+                <a14:m>
+                  <m:oMathPara xmlns:m="http://schemas.openxmlformats.org/officeDocument/2006/math">
+                    <m:oMathParaPr>
+                      <m:jc m:val="centerGroup"/>
+                    </m:oMathParaPr>
+                    <m:oMath xmlns:m="http://schemas.openxmlformats.org/officeDocument/2006/math">
+                      <m:sSub>
+                        <m:sSubPr>
+                          <m:ctrlPr>
+                            <a:rPr lang="en-US" altLang="ko-KR" sz="2000" b="1" i="1">
+                              <a:latin typeface="Cambria Math" panose="02040503050406030204" pitchFamily="18" charset="0"/>
+                            </a:rPr>
+                          </m:ctrlPr>
+                        </m:sSubPr>
+                        <m:e>
+                          <m:r>
+                            <a:rPr lang="en-US" altLang="ko-KR" sz="2000" b="1" i="1">
+                              <a:latin typeface="Cambria Math" panose="02040503050406030204" pitchFamily="18" charset="0"/>
+                            </a:rPr>
+                            <m:t>𝒅</m:t>
+                          </m:r>
+                        </m:e>
+                        <m:sub>
+                          <m:r>
+                            <a:rPr lang="en-US" altLang="ko-KR" sz="2000" b="1" i="1">
+                              <a:latin typeface="Cambria Math" panose="02040503050406030204" pitchFamily="18" charset="0"/>
+                            </a:rPr>
+                            <m:t>𝟏</m:t>
+                          </m:r>
+                        </m:sub>
+                      </m:sSub>
+                    </m:oMath>
+                  </m:oMathPara>
+                </a14:m>
+                <a:endParaRPr lang="ko-KR" altLang="en-US" sz="2000" b="1" dirty="0"/>
+              </a:p>
+            </p:txBody>
+          </p:sp>
+        </mc:Choice>
+        <mc:Fallback>
+          <p:sp>
+            <p:nvSpPr>
+              <p:cNvPr id="12" name="TextBox 11"/>
+              <p:cNvSpPr txBox="1">
+                <a:spLocks noRot="1" noChangeAspect="1" noMove="1" noResize="1" noEditPoints="1" noAdjustHandles="1" noChangeArrowheads="1" noChangeShapeType="1" noTextEdit="1"/>
+              </p:cNvSpPr>
+              <p:nvPr/>
+            </p:nvSpPr>
+            <p:spPr>
+              <a:xfrm>
+                <a:off x="1905232" y="1478562"/>
+                <a:ext cx="345671" cy="307777"/>
+              </a:xfrm>
+              <a:prstGeom prst="rect">
+                <a:avLst/>
+              </a:prstGeom>
+              <a:blipFill>
+                <a:blip r:embed="rId6"/>
+                <a:stretch>
+                  <a:fillRect l="-19643" r="-10714" b="-18000"/>
+                </a:stretch>
+              </a:blipFill>
+            </p:spPr>
+            <p:txBody>
+              <a:bodyPr/>
+              <a:lstStyle/>
+              <a:p>
+                <a:r>
+                  <a:rPr lang="ko-KR" altLang="en-US">
+                    <a:noFill/>
+                  </a:rPr>
+                  <a:t> </a:t>
+                </a:r>
+              </a:p>
+            </p:txBody>
+          </p:sp>
+        </mc:Fallback>
+      </mc:AlternateContent>
+      <mc:AlternateContent xmlns:mc="http://schemas.openxmlformats.org/markup-compatibility/2006">
+        <mc:Choice xmlns:a14="http://schemas.microsoft.com/office/drawing/2010/main" Requires="a14">
+          <p:sp>
+            <p:nvSpPr>
+              <p:cNvPr id="28" name="TextBox 27"/>
+              <p:cNvSpPr txBox="1"/>
+              <p:nvPr/>
+            </p:nvSpPr>
+            <p:spPr>
+              <a:xfrm>
+                <a:off x="3000062" y="2089011"/>
+                <a:ext cx="961417" cy="307777"/>
+              </a:xfrm>
+              <a:prstGeom prst="rect">
+                <a:avLst/>
+              </a:prstGeom>
+              <a:noFill/>
+            </p:spPr>
+            <p:txBody>
+              <a:bodyPr wrap="none" lIns="0" tIns="0" rIns="0" bIns="0" rtlCol="0">
+                <a:spAutoFit/>
+              </a:bodyPr>
+              <a:lstStyle/>
+              <a:p>
+                <a14:m>
+                  <m:oMathPara xmlns:m="http://schemas.openxmlformats.org/officeDocument/2006/math">
+                    <m:oMathParaPr>
+                      <m:jc m:val="centerGroup"/>
+                    </m:oMathParaPr>
+                    <m:oMath xmlns:m="http://schemas.openxmlformats.org/officeDocument/2006/math">
+                      <m:sSub>
+                        <m:sSubPr>
+                          <m:ctrlPr>
+                            <a:rPr lang="en-US" altLang="ko-KR" sz="2000" b="1" i="1" smtClean="0">
+                              <a:latin typeface="Cambria Math" panose="02040503050406030204" pitchFamily="18" charset="0"/>
+                            </a:rPr>
+                          </m:ctrlPr>
+                        </m:sSubPr>
+                        <m:e>
+                          <m:r>
+                            <a:rPr lang="en-US" altLang="ko-KR" sz="2000" b="1" i="1" smtClean="0">
+                              <a:latin typeface="Cambria Math" panose="02040503050406030204" pitchFamily="18" charset="0"/>
+                            </a:rPr>
+                            <m:t>𝒅</m:t>
+                          </m:r>
+                        </m:e>
+                        <m:sub>
+                          <m:r>
+                            <a:rPr lang="en-US" altLang="ko-KR" sz="2000" b="1" i="1" smtClean="0">
+                              <a:latin typeface="Cambria Math" panose="02040503050406030204" pitchFamily="18" charset="0"/>
+                            </a:rPr>
+                            <m:t>𝟏</m:t>
+                          </m:r>
+                        </m:sub>
+                      </m:sSub>
+                      <m:r>
+                        <a:rPr lang="en-US" altLang="ko-KR" sz="2000" b="1" i="1" smtClean="0">
+                          <a:latin typeface="Cambria Math" panose="02040503050406030204" pitchFamily="18" charset="0"/>
+                        </a:rPr>
+                        <m:t>+</m:t>
+                      </m:r>
+                      <m:r>
+                        <a:rPr lang="en-US" altLang="ko-KR" sz="2000" b="0" i="1" smtClean="0">
+                          <a:latin typeface="Cambria Math" panose="02040503050406030204" pitchFamily="18" charset="0"/>
+                          <a:ea typeface="Cambria Math" panose="02040503050406030204" pitchFamily="18" charset="0"/>
+                        </a:rPr>
+                        <m:t>∆</m:t>
+                      </m:r>
+                      <m:r>
+                        <m:rPr>
+                          <m:nor/>
+                        </m:rPr>
+                        <a:rPr lang="ko-KR" altLang="en-US" sz="2000" b="1" smtClean="0">
+                          <a:latin typeface="Cambria Math" panose="02040503050406030204" pitchFamily="18" charset="0"/>
+                          <a:ea typeface="Cambria Math" panose="02040503050406030204" pitchFamily="18" charset="0"/>
+                        </a:rPr>
+                        <m:t>𝛈</m:t>
+                      </m:r>
+                    </m:oMath>
+                  </m:oMathPara>
+                </a14:m>
+                <a:endParaRPr lang="ko-KR" altLang="en-US" sz="2000" b="1" dirty="0"/>
+              </a:p>
+            </p:txBody>
+          </p:sp>
+        </mc:Choice>
+        <mc:Fallback>
+          <p:sp>
+            <p:nvSpPr>
+              <p:cNvPr id="28" name="TextBox 27"/>
+              <p:cNvSpPr txBox="1">
+                <a:spLocks noRot="1" noChangeAspect="1" noMove="1" noResize="1" noEditPoints="1" noAdjustHandles="1" noChangeArrowheads="1" noChangeShapeType="1" noTextEdit="1"/>
+              </p:cNvSpPr>
+              <p:nvPr/>
+            </p:nvSpPr>
+            <p:spPr>
+              <a:xfrm>
+                <a:off x="3000062" y="2089011"/>
+                <a:ext cx="961417" cy="307777"/>
+              </a:xfrm>
+              <a:prstGeom prst="rect">
+                <a:avLst/>
+              </a:prstGeom>
+              <a:blipFill>
+                <a:blip r:embed="rId7"/>
+                <a:stretch>
+                  <a:fillRect l="-6329" r="-6962" b="-26000"/>
+                </a:stretch>
+              </a:blipFill>
+            </p:spPr>
+            <p:txBody>
+              <a:bodyPr/>
+              <a:lstStyle/>
+              <a:p>
+                <a:r>
+                  <a:rPr lang="ko-KR" altLang="en-US">
+                    <a:noFill/>
+                  </a:rPr>
+                  <a:t> </a:t>
+                </a:r>
+              </a:p>
+            </p:txBody>
+          </p:sp>
+        </mc:Fallback>
+      </mc:AlternateContent>
+      <p:cxnSp>
+        <p:nvCxnSpPr>
+          <p:cNvPr id="31" name="직선 연결선 30"/>
+          <p:cNvCxnSpPr/>
+          <p:nvPr/>
+        </p:nvCxnSpPr>
+        <p:spPr>
+          <a:xfrm>
+            <a:off x="5822747" y="1266825"/>
+            <a:ext cx="1893553" cy="2176968"/>
+          </a:xfrm>
+          <a:prstGeom prst="line">
+            <a:avLst/>
+          </a:prstGeom>
+          <a:ln w="19050">
+            <a:solidFill>
+              <a:schemeClr val="tx1"/>
+            </a:solidFill>
+          </a:ln>
+        </p:spPr>
+        <p:style>
+          <a:lnRef idx="1">
+            <a:schemeClr val="accent1"/>
+          </a:lnRef>
+          <a:fillRef idx="0">
+            <a:schemeClr val="accent1"/>
+          </a:fillRef>
+          <a:effectRef idx="0">
+            <a:schemeClr val="accent1"/>
+          </a:effectRef>
+          <a:fontRef idx="minor">
+            <a:schemeClr val="tx1"/>
+          </a:fontRef>
+        </p:style>
+      </p:cxnSp>
+      <mc:AlternateContent xmlns:mc="http://schemas.openxmlformats.org/markup-compatibility/2006">
+        <mc:Choice xmlns:a14="http://schemas.microsoft.com/office/drawing/2010/main" Requires="a14">
+          <p:sp>
+            <p:nvSpPr>
+              <p:cNvPr id="34" name="TextBox 33"/>
+              <p:cNvSpPr txBox="1"/>
+              <p:nvPr/>
+            </p:nvSpPr>
+            <p:spPr>
+              <a:xfrm>
+                <a:off x="6693642" y="2040135"/>
+                <a:ext cx="345671" cy="307777"/>
+              </a:xfrm>
+              <a:prstGeom prst="rect">
+                <a:avLst/>
+              </a:prstGeom>
+              <a:noFill/>
+            </p:spPr>
+            <p:txBody>
+              <a:bodyPr wrap="none" lIns="0" tIns="0" rIns="0" bIns="0" rtlCol="0">
+                <a:spAutoFit/>
+              </a:bodyPr>
+              <a:lstStyle/>
+              <a:p>
+                <a14:m>
+                  <m:oMathPara xmlns:m="http://schemas.openxmlformats.org/officeDocument/2006/math">
+                    <m:oMathParaPr>
+                      <m:jc m:val="centerGroup"/>
+                    </m:oMathParaPr>
+                    <m:oMath xmlns:m="http://schemas.openxmlformats.org/officeDocument/2006/math">
+                      <m:sSub>
+                        <m:sSubPr>
+                          <m:ctrlPr>
+                            <a:rPr lang="en-US" altLang="ko-KR" sz="2000" b="1" i="1" smtClean="0">
+                              <a:latin typeface="Cambria Math" panose="02040503050406030204" pitchFamily="18" charset="0"/>
+                            </a:rPr>
+                          </m:ctrlPr>
+                        </m:sSubPr>
+                        <m:e>
+                          <m:r>
+                            <a:rPr lang="en-US" altLang="ko-KR" sz="2000" b="1" i="1">
+                              <a:latin typeface="Cambria Math" panose="02040503050406030204" pitchFamily="18" charset="0"/>
+                            </a:rPr>
+                            <m:t>𝒅</m:t>
+                          </m:r>
+                        </m:e>
+                        <m:sub>
+                          <m:r>
+                            <a:rPr lang="en-US" altLang="ko-KR" sz="2000" b="1" i="1" smtClean="0">
+                              <a:latin typeface="Cambria Math" panose="02040503050406030204" pitchFamily="18" charset="0"/>
+                            </a:rPr>
+                            <m:t>𝟐</m:t>
+                          </m:r>
+                        </m:sub>
+                      </m:sSub>
+                    </m:oMath>
+                  </m:oMathPara>
+                </a14:m>
+                <a:endParaRPr lang="ko-KR" altLang="en-US" sz="2000" b="1" dirty="0"/>
+              </a:p>
+            </p:txBody>
+          </p:sp>
+        </mc:Choice>
+        <mc:Fallback>
+          <p:sp>
+            <p:nvSpPr>
+              <p:cNvPr id="34" name="TextBox 33"/>
+              <p:cNvSpPr txBox="1">
+                <a:spLocks noRot="1" noChangeAspect="1" noMove="1" noResize="1" noEditPoints="1" noAdjustHandles="1" noChangeArrowheads="1" noChangeShapeType="1" noTextEdit="1"/>
+              </p:cNvSpPr>
+              <p:nvPr/>
+            </p:nvSpPr>
+            <p:spPr>
+              <a:xfrm>
+                <a:off x="6693642" y="2040135"/>
+                <a:ext cx="345671" cy="307777"/>
+              </a:xfrm>
+              <a:prstGeom prst="rect">
+                <a:avLst/>
+              </a:prstGeom>
+              <a:blipFill>
+                <a:blip r:embed="rId8"/>
+                <a:stretch>
+                  <a:fillRect l="-17544" r="-8772" b="-18000"/>
+                </a:stretch>
+              </a:blipFill>
+            </p:spPr>
+            <p:txBody>
+              <a:bodyPr/>
+              <a:lstStyle/>
+              <a:p>
+                <a:r>
+                  <a:rPr lang="ko-KR" altLang="en-US">
+                    <a:noFill/>
+                  </a:rPr>
+                  <a:t> </a:t>
+                </a:r>
+              </a:p>
+            </p:txBody>
+          </p:sp>
+        </mc:Fallback>
+      </mc:AlternateContent>
     </p:spTree>
     <p:extLst>
       <p:ext uri="{BB962C8B-B14F-4D97-AF65-F5344CB8AC3E}">

</xml_diff>